<commit_message>
change wording of ORCode to Pass. Remove old version.
</commit_message>
<xml_diff>
--- a/docs/marketing/registerForOnlineCheckin_SNMC-rev1.2.pptx
+++ b/docs/marketing/registerForOnlineCheckin_SNMC-rev1.2.pptx
@@ -9535,8 +9535,8 @@
   <p:transition spd="slow" advTm="2419">
     <p:randomBar dir="vert"/>
   </p:transition>
-  <mc:AlternateContent xmlns:mc="http://schemas.openxmlformats.org/markup-compatibility/2006">
-    <mc:Choice xmlns:p14="http://schemas.microsoft.com/office/powerpoint/2010/main" Requires="p14">
+  <mc:AlternateContent xmlns:mc="http://schemas.openxmlformats.org/markup-compatibility/2006" xmlns:p14="http://schemas.microsoft.com/office/powerpoint/2010/main">
+    <mc:Choice Requires="p14">
       <p:timing>
         <p:tnLst>
           <p:par>
@@ -9705,7 +9705,7 @@
         </p:bldLst>
       </p:timing>
     </mc:Choice>
-    <mc:Fallback>
+    <mc:Fallback xmlns="">
       <p:timing>
         <p:tnLst>
           <p:par>
@@ -17466,7 +17466,7 @@
                 <a:latin typeface="Futura Medium" panose="020B0602020204020303" pitchFamily="34" charset="-79"/>
                 <a:cs typeface="Futura Medium" panose="020B0602020204020303" pitchFamily="34" charset="-79"/>
               </a:rPr>
-              <a:t>Print Your QR Code &amp; bring it with you</a:t>
+              <a:t>Print Your pass &amp; bring it with you</a:t>
             </a:r>
           </a:p>
         </p:txBody>

</xml_diff>